<commit_message>
cleaning up project presentation
</commit_message>
<xml_diff>
--- a/Happiness vs Indicators_consolidated.pptx
+++ b/Happiness vs Indicators_consolidated.pptx
@@ -15126,8 +15126,8 @@
         </p:blipFill>
         <p:spPr>
           <a:xfrm>
-            <a:off x="401054" y="2603500"/>
-            <a:ext cx="5579060" cy="4254500"/>
+            <a:off x="0" y="2422358"/>
+            <a:ext cx="6208712" cy="4435640"/>
           </a:xfrm>
         </p:spPr>
       </p:pic>
@@ -15168,6 +15168,12 @@
             <a:r>
               <a:rPr lang="en-US" sz="2400" dirty="0"/>
               <a:t>- Each red circle represents a country</a:t>
+            </a:r>
+          </a:p>
+          <a:p>
+            <a:r>
+              <a:rPr lang="en-US" sz="2400" dirty="0"/>
+              <a:t>Literacy is defined as the ability to read and write</a:t>
             </a:r>
           </a:p>
           <a:p>
@@ -15282,8 +15288,8 @@
         </p:blipFill>
         <p:spPr>
           <a:xfrm>
-            <a:off x="316793" y="2712801"/>
-            <a:ext cx="7475621" cy="3719448"/>
+            <a:off x="316793" y="2285999"/>
+            <a:ext cx="7475621" cy="4146250"/>
           </a:xfrm>
           <a:prstGeom prst="rect">
             <a:avLst/>
@@ -15719,7 +15725,7 @@
         <p:spPr>
           <a:xfrm>
             <a:off x="563359" y="2536371"/>
-            <a:ext cx="10180841" cy="3693319"/>
+            <a:ext cx="10180841" cy="3970318"/>
           </a:xfrm>
           <a:prstGeom prst="rect">
             <a:avLst/>
@@ -15812,7 +15818,10 @@
               <a:buFont typeface="Arial" panose="020B0604020202020204" pitchFamily="34" charset="0"/>
               <a:buChar char="•"/>
             </a:pPr>
-            <a:endParaRPr lang="en-US" dirty="0"/>
+            <a:r>
+              <a:rPr lang="en-US" dirty="0"/>
+              <a:t>Happiness data may have bias. There is vagueness regarding how the scores were generated.</a:t>
+            </a:r>
           </a:p>
           <a:p>
             <a:pPr marL="285750" indent="-285750">
@@ -17421,7 +17430,7 @@
       </p:sp>
       <p:pic>
         <p:nvPicPr>
-          <p:cNvPr id="5" name="Content Placeholder 4" descr="A screenshot of a cell phone&#10;&#10;Description automatically generated">
+          <p:cNvPr id="5" name="Content Placeholder 4">
             <a:extLst>
               <a:ext uri="{FF2B5EF4-FFF2-40B4-BE49-F238E27FC236}">
                 <a16:creationId xmlns:a16="http://schemas.microsoft.com/office/drawing/2014/main" id="{3FA4F07E-CF94-4E53-B4FF-D833A70882D6}"/>
@@ -17443,8 +17452,8 @@
         </p:blipFill>
         <p:spPr>
           <a:xfrm>
-            <a:off x="0" y="2603500"/>
-            <a:ext cx="5980113" cy="4254500"/>
+            <a:off x="0" y="2454443"/>
+            <a:ext cx="6208712" cy="4403556"/>
           </a:xfrm>
         </p:spPr>
       </p:pic>
@@ -17472,7 +17481,7 @@
         </p:spPr>
         <p:txBody>
           <a:bodyPr>
-            <a:normAutofit/>
+            <a:normAutofit lnSpcReduction="10000"/>
           </a:bodyPr>
           <a:lstStyle/>
           <a:p>
@@ -17485,6 +17494,12 @@
             <a:r>
               <a:rPr lang="en-US" sz="2400" dirty="0"/>
               <a:t>- Each red circle represents a country</a:t>
+            </a:r>
+          </a:p>
+          <a:p>
+            <a:r>
+              <a:rPr lang="en-US" sz="2400" dirty="0"/>
+              <a:t>Infant mortality refers to deaths of young children, typically &lt; 1yr old</a:t>
             </a:r>
           </a:p>
           <a:p>

</xml_diff>